<commit_message>
Update or add songs lyric
</commit_message>
<xml_diff>
--- a/15齊來頌揚.pptx
+++ b/15齊來頌揚.pptx
@@ -251,7 +251,7 @@
             <a:fld id="{86B5546F-C09B-4E63-ABC5-F7C86A7E8D66}" type="datetimeFigureOut">
               <a:rPr lang="en-US" smtClean="0"/>
               <a:pPr/>
-              <a:t>2/25/2017</a:t>
+              <a:t>2/23/2019</a:t>
             </a:fld>
             <a:endParaRPr lang="en-US"/>
           </a:p>
@@ -1122,7 +1122,7 @@
             <a:fld id="{86B5546F-C09B-4E63-ABC5-F7C86A7E8D66}" type="datetimeFigureOut">
               <a:rPr lang="en-US" smtClean="0"/>
               <a:pPr/>
-              <a:t>2/25/2017</a:t>
+              <a:t>2/23/2019</a:t>
             </a:fld>
             <a:endParaRPr lang="en-US"/>
           </a:p>
@@ -1299,7 +1299,7 @@
             <a:fld id="{86B5546F-C09B-4E63-ABC5-F7C86A7E8D66}" type="datetimeFigureOut">
               <a:rPr lang="en-US" smtClean="0"/>
               <a:pPr/>
-              <a:t>2/25/2017</a:t>
+              <a:t>2/23/2019</a:t>
             </a:fld>
             <a:endParaRPr lang="en-US"/>
           </a:p>
@@ -1471,7 +1471,7 @@
             <a:fld id="{86B5546F-C09B-4E63-ABC5-F7C86A7E8D66}" type="datetimeFigureOut">
               <a:rPr lang="en-US" smtClean="0"/>
               <a:pPr/>
-              <a:t>2/25/2017</a:t>
+              <a:t>2/23/2019</a:t>
             </a:fld>
             <a:endParaRPr lang="en-US"/>
           </a:p>
@@ -1683,7 +1683,7 @@
             <a:fld id="{86B5546F-C09B-4E63-ABC5-F7C86A7E8D66}" type="datetimeFigureOut">
               <a:rPr lang="en-US" smtClean="0"/>
               <a:pPr/>
-              <a:t>2/25/2017</a:t>
+              <a:t>2/23/2019</a:t>
             </a:fld>
             <a:endParaRPr lang="en-US"/>
           </a:p>
@@ -2499,7 +2499,7 @@
             <a:fld id="{86B5546F-C09B-4E63-ABC5-F7C86A7E8D66}" type="datetimeFigureOut">
               <a:rPr lang="en-US" smtClean="0"/>
               <a:pPr/>
-              <a:t>2/25/2017</a:t>
+              <a:t>2/23/2019</a:t>
             </a:fld>
             <a:endParaRPr lang="en-US"/>
           </a:p>
@@ -2737,7 +2737,7 @@
             <a:fld id="{86B5546F-C09B-4E63-ABC5-F7C86A7E8D66}" type="datetimeFigureOut">
               <a:rPr lang="en-US" smtClean="0"/>
               <a:pPr/>
-              <a:t>2/25/2017</a:t>
+              <a:t>2/23/2019</a:t>
             </a:fld>
             <a:endParaRPr lang="en-US"/>
           </a:p>
@@ -3062,7 +3062,7 @@
             <a:fld id="{86B5546F-C09B-4E63-ABC5-F7C86A7E8D66}" type="datetimeFigureOut">
               <a:rPr lang="en-US" smtClean="0"/>
               <a:pPr/>
-              <a:t>2/25/2017</a:t>
+              <a:t>2/23/2019</a:t>
             </a:fld>
             <a:endParaRPr lang="en-US"/>
           </a:p>
@@ -3154,7 +3154,7 @@
             <a:fld id="{86B5546F-C09B-4E63-ABC5-F7C86A7E8D66}" type="datetimeFigureOut">
               <a:rPr lang="en-US" smtClean="0"/>
               <a:pPr/>
-              <a:t>2/25/2017</a:t>
+              <a:t>2/23/2019</a:t>
             </a:fld>
             <a:endParaRPr lang="en-US"/>
           </a:p>
@@ -3673,7 +3673,7 @@
             <a:fld id="{86B5546F-C09B-4E63-ABC5-F7C86A7E8D66}" type="datetimeFigureOut">
               <a:rPr lang="en-US" smtClean="0"/>
               <a:pPr/>
-              <a:t>2/25/2017</a:t>
+              <a:t>2/23/2019</a:t>
             </a:fld>
             <a:endParaRPr lang="en-US"/>
           </a:p>
@@ -4186,7 +4186,7 @@
             <a:fld id="{86B5546F-C09B-4E63-ABC5-F7C86A7E8D66}" type="datetimeFigureOut">
               <a:rPr lang="en-US" smtClean="0"/>
               <a:pPr/>
-              <a:t>2/25/2017</a:t>
+              <a:t>2/23/2019</a:t>
             </a:fld>
             <a:endParaRPr lang="en-US"/>
           </a:p>
@@ -4433,7 +4433,7 @@
             <a:fld id="{86B5546F-C09B-4E63-ABC5-F7C86A7E8D66}" type="datetimeFigureOut">
               <a:rPr lang="en-US" smtClean="0"/>
               <a:pPr/>
-              <a:t>2/25/2017</a:t>
+              <a:t>2/23/2019</a:t>
             </a:fld>
             <a:endParaRPr lang="en-US"/>
           </a:p>
@@ -5057,10 +5057,16 @@
           <a:lstStyle/>
           <a:p>
             <a:r>
-              <a:rPr lang="zh-CN" altLang="en-US" sz="8000" dirty="0" smtClean="0"/>
+              <a:rPr lang="zh-CN" altLang="en-US" sz="8000" dirty="0" smtClean="0">
+                <a:latin typeface="微軟正黑體" pitchFamily="34" charset="-120"/>
+                <a:ea typeface="微軟正黑體" pitchFamily="34" charset="-120"/>
+              </a:rPr>
               <a:t>齊來頌揚</a:t>
             </a:r>
-            <a:endParaRPr lang="en-US" sz="8000" dirty="0"/>
+            <a:endParaRPr lang="en-US" sz="8000" dirty="0">
+              <a:latin typeface="微軟正黑體" pitchFamily="34" charset="-120"/>
+              <a:ea typeface="微軟正黑體" pitchFamily="34" charset="-120"/>
+            </a:endParaRPr>
           </a:p>
         </p:txBody>
       </p:sp>
@@ -5082,46 +5088,79 @@
           <a:lstStyle/>
           <a:p>
             <a:r>
-              <a:rPr lang="zh-CN" altLang="en-US" dirty="0" smtClean="0"/>
+              <a:rPr lang="zh-CN" altLang="en-US" dirty="0" smtClean="0">
+                <a:latin typeface="微軟正黑體" pitchFamily="34" charset="-120"/>
+                <a:ea typeface="微軟正黑體" pitchFamily="34" charset="-120"/>
+              </a:rPr>
               <a:t>詩</a:t>
             </a:r>
             <a:r>
-              <a:rPr lang="en-US" altLang="zh-CN" dirty="0" smtClean="0"/>
+              <a:rPr lang="en-US" altLang="zh-CN" dirty="0" smtClean="0">
+                <a:latin typeface="微軟正黑體" pitchFamily="34" charset="-120"/>
+                <a:ea typeface="微軟正黑體" pitchFamily="34" charset="-120"/>
+              </a:rPr>
               <a:t>148</a:t>
             </a:r>
             <a:r>
-              <a:rPr lang="zh-CN" altLang="en-US" dirty="0" smtClean="0"/>
+              <a:rPr lang="zh-CN" altLang="en-US" dirty="0" smtClean="0">
+                <a:latin typeface="微軟正黑體" pitchFamily="34" charset="-120"/>
+                <a:ea typeface="微軟正黑體" pitchFamily="34" charset="-120"/>
+              </a:rPr>
               <a:t>：</a:t>
             </a:r>
             <a:r>
-              <a:rPr lang="en-US" altLang="zh-CN" dirty="0" smtClean="0"/>
+              <a:rPr lang="en-US" altLang="zh-CN" dirty="0" smtClean="0">
+                <a:latin typeface="微軟正黑體" pitchFamily="34" charset="-120"/>
+                <a:ea typeface="微軟正黑體" pitchFamily="34" charset="-120"/>
+              </a:rPr>
               <a:t>1-4</a:t>
             </a:r>
             <a:r>
-              <a:rPr lang="zh-CN" altLang="en-US" dirty="0" smtClean="0"/>
+              <a:rPr lang="zh-CN" altLang="en-US" dirty="0" smtClean="0">
+                <a:latin typeface="微軟正黑體" pitchFamily="34" charset="-120"/>
+                <a:ea typeface="微軟正黑體" pitchFamily="34" charset="-120"/>
+              </a:rPr>
               <a:t>，</a:t>
             </a:r>
             <a:r>
-              <a:rPr lang="en-US" altLang="zh-CN" dirty="0" smtClean="0"/>
+              <a:rPr lang="en-US" altLang="zh-CN" dirty="0" smtClean="0">
+                <a:latin typeface="微軟正黑體" pitchFamily="34" charset="-120"/>
+                <a:ea typeface="微軟正黑體" pitchFamily="34" charset="-120"/>
+              </a:rPr>
               <a:t>7-12</a:t>
             </a:r>
             <a:r>
-              <a:rPr lang="zh-CN" altLang="en-US" dirty="0" smtClean="0"/>
+              <a:rPr lang="zh-CN" altLang="en-US" dirty="0" smtClean="0">
+                <a:latin typeface="微軟正黑體" pitchFamily="34" charset="-120"/>
+                <a:ea typeface="微軟正黑體" pitchFamily="34" charset="-120"/>
+              </a:rPr>
               <a:t>；</a:t>
             </a:r>
             <a:r>
-              <a:rPr lang="en-US" altLang="zh-CN" dirty="0" smtClean="0"/>
+              <a:rPr lang="en-US" altLang="zh-CN" dirty="0" smtClean="0">
+                <a:latin typeface="微軟正黑體" pitchFamily="34" charset="-120"/>
+                <a:ea typeface="微軟正黑體" pitchFamily="34" charset="-120"/>
+              </a:rPr>
               <a:t>150</a:t>
             </a:r>
             <a:r>
-              <a:rPr lang="zh-CN" altLang="en-US" dirty="0" smtClean="0"/>
+              <a:rPr lang="zh-CN" altLang="en-US" dirty="0" smtClean="0">
+                <a:latin typeface="微軟正黑體" pitchFamily="34" charset="-120"/>
+                <a:ea typeface="微軟正黑體" pitchFamily="34" charset="-120"/>
+              </a:rPr>
               <a:t>：</a:t>
             </a:r>
             <a:r>
-              <a:rPr lang="en-US" altLang="zh-CN" dirty="0" smtClean="0"/>
+              <a:rPr lang="en-US" altLang="zh-CN" dirty="0" smtClean="0">
+                <a:latin typeface="微軟正黑體" pitchFamily="34" charset="-120"/>
+                <a:ea typeface="微軟正黑體" pitchFamily="34" charset="-120"/>
+              </a:rPr>
               <a:t>3-6</a:t>
             </a:r>
-            <a:endParaRPr lang="en-US" dirty="0"/>
+            <a:endParaRPr lang="en-US" dirty="0">
+              <a:latin typeface="微軟正黑體" pitchFamily="34" charset="-120"/>
+              <a:ea typeface="微軟正黑體" pitchFamily="34" charset="-120"/>
+            </a:endParaRPr>
           </a:p>
         </p:txBody>
       </p:sp>
@@ -5180,21 +5219,33 @@
           <a:lstStyle/>
           <a:p>
             <a:r>
-              <a:rPr lang="zh-TW" altLang="en-US" sz="6000" dirty="0" smtClean="0"/>
+              <a:rPr lang="zh-TW" altLang="en-US" sz="6000" dirty="0" smtClean="0">
+                <a:latin typeface="微軟正黑體" pitchFamily="34" charset="-120"/>
+                <a:ea typeface="微軟正黑體" pitchFamily="34" charset="-120"/>
+              </a:rPr>
               <a:t>你們要讚美耶和華！從天上讚美耶和華，在高處讚美他！</a:t>
             </a:r>
             <a:r>
-              <a:rPr lang="en-US" altLang="zh-TW" sz="6000" dirty="0" smtClean="0"/>
+              <a:rPr lang="en-US" altLang="zh-TW" sz="6000" dirty="0" smtClean="0">
+                <a:latin typeface="微軟正黑體" pitchFamily="34" charset="-120"/>
+                <a:ea typeface="微軟正黑體" pitchFamily="34" charset="-120"/>
+              </a:rPr>
               <a:t> </a:t>
             </a:r>
           </a:p>
           <a:p>
             <a:r>
-              <a:rPr lang="zh-TW" altLang="en-US" sz="6000" b="1" dirty="0" smtClean="0"/>
+              <a:rPr lang="zh-TW" altLang="en-US" sz="6000" b="1" dirty="0" smtClean="0">
+                <a:latin typeface="微軟正黑體" pitchFamily="34" charset="-120"/>
+                <a:ea typeface="微軟正黑體" pitchFamily="34" charset="-120"/>
+              </a:rPr>
               <a:t>他的眾使者都要讚美他！他的諸軍都要讚美他！</a:t>
             </a:r>
             <a:r>
-              <a:rPr lang="en-US" altLang="zh-TW" sz="6000" b="1" dirty="0" smtClean="0"/>
+              <a:rPr lang="en-US" altLang="zh-TW" sz="6000" b="1" dirty="0" smtClean="0">
+                <a:latin typeface="微軟正黑體" pitchFamily="34" charset="-120"/>
+                <a:ea typeface="微軟正黑體" pitchFamily="34" charset="-120"/>
+              </a:rPr>
               <a:t> </a:t>
             </a:r>
           </a:p>
@@ -5255,29 +5306,36 @@
           <a:lstStyle/>
           <a:p>
             <a:r>
-              <a:rPr lang="zh-TW" altLang="en-US" sz="6000" dirty="0" smtClean="0"/>
+              <a:rPr lang="zh-TW" altLang="en-US" sz="6000" dirty="0" smtClean="0">
+                <a:latin typeface="微軟正黑體" pitchFamily="34" charset="-120"/>
+                <a:ea typeface="微軟正黑體" pitchFamily="34" charset="-120"/>
+              </a:rPr>
               <a:t>日頭月亮，你們要讚美他！放光的星宿，你們都要讚美他！</a:t>
             </a:r>
             <a:r>
-              <a:rPr lang="en-US" altLang="zh-TW" sz="6000" dirty="0" smtClean="0"/>
+              <a:rPr lang="en-US" altLang="zh-TW" sz="6000" dirty="0" smtClean="0">
+                <a:latin typeface="微軟正黑體" pitchFamily="34" charset="-120"/>
+                <a:ea typeface="微軟正黑體" pitchFamily="34" charset="-120"/>
+              </a:rPr>
               <a:t> </a:t>
             </a:r>
-            <a:endParaRPr lang="en-US" altLang="zh-TW" sz="6000" b="1" dirty="0" smtClean="0"/>
-          </a:p>
-          <a:p>
-            <a:r>
-              <a:rPr lang="zh-TW" altLang="en-US" sz="6000" b="1" dirty="0" smtClean="0"/>
-              <a:t>天上</a:t>
-            </a:r>
-            <a:r>
-              <a:rPr lang="zh-TW" altLang="en-US" sz="6000" b="1" dirty="0" smtClean="0"/>
-              <a:t>的天和天上的水，你們都要讚美他</a:t>
-            </a:r>
-            <a:r>
-              <a:rPr lang="zh-TW" altLang="en-US" sz="6000" b="1" dirty="0" smtClean="0"/>
-              <a:t>！</a:t>
-            </a:r>
-            <a:endParaRPr lang="en-US" altLang="zh-TW" sz="6000" b="1" dirty="0" smtClean="0"/>
+            <a:endParaRPr lang="en-US" altLang="zh-TW" sz="6000" b="1" dirty="0" smtClean="0">
+              <a:latin typeface="微軟正黑體" pitchFamily="34" charset="-120"/>
+              <a:ea typeface="微軟正黑體" pitchFamily="34" charset="-120"/>
+            </a:endParaRPr>
+          </a:p>
+          <a:p>
+            <a:r>
+              <a:rPr lang="zh-TW" altLang="en-US" sz="6000" b="1" dirty="0" smtClean="0">
+                <a:latin typeface="微軟正黑體" pitchFamily="34" charset="-120"/>
+                <a:ea typeface="微軟正黑體" pitchFamily="34" charset="-120"/>
+              </a:rPr>
+              <a:t>天上的天和天上的水，你們都要讚美他！</a:t>
+            </a:r>
+            <a:endParaRPr lang="en-US" altLang="zh-TW" sz="6000" b="1" dirty="0" smtClean="0">
+              <a:latin typeface="微軟正黑體" pitchFamily="34" charset="-120"/>
+              <a:ea typeface="微軟正黑體" pitchFamily="34" charset="-120"/>
+            </a:endParaRPr>
           </a:p>
         </p:txBody>
       </p:sp>
@@ -5336,20 +5394,25 @@
           <a:lstStyle/>
           <a:p>
             <a:r>
-              <a:rPr lang="zh-TW" altLang="en-US" sz="6000" dirty="0" smtClean="0"/>
+              <a:rPr lang="zh-TW" altLang="en-US" sz="6000" dirty="0" smtClean="0">
+                <a:latin typeface="微軟正黑體" pitchFamily="34" charset="-120"/>
+                <a:ea typeface="微軟正黑體" pitchFamily="34" charset="-120"/>
+              </a:rPr>
               <a:t>所有在地上的，大魚和一切深洋，火與冰雹，雪和霧氣，成就他命的狂風</a:t>
             </a:r>
           </a:p>
           <a:p>
             <a:r>
-              <a:rPr lang="zh-TW" altLang="en-US" sz="6000" b="1" dirty="0" smtClean="0"/>
-              <a:t>大山和小山，結果的樹木和一切香柏樹，野獸和一切牲畜，昆蟲和</a:t>
-            </a:r>
-            <a:r>
-              <a:rPr lang="zh-TW" altLang="en-US" sz="6000" b="1" dirty="0" smtClean="0"/>
-              <a:t>飛鳥</a:t>
-            </a:r>
-            <a:endParaRPr lang="en-US" altLang="zh-TW" sz="6000" b="1" dirty="0" smtClean="0"/>
+              <a:rPr lang="zh-TW" altLang="en-US" sz="6000" b="1" dirty="0" smtClean="0">
+                <a:latin typeface="微軟正黑體" pitchFamily="34" charset="-120"/>
+                <a:ea typeface="微軟正黑體" pitchFamily="34" charset="-120"/>
+              </a:rPr>
+              <a:t>大山和小山，結果的樹木和一切香柏樹，野獸和一切牲畜，昆蟲和飛鳥</a:t>
+            </a:r>
+            <a:endParaRPr lang="en-US" altLang="zh-TW" sz="6000" b="1" dirty="0" smtClean="0">
+              <a:latin typeface="微軟正黑體" pitchFamily="34" charset="-120"/>
+              <a:ea typeface="微軟正黑體" pitchFamily="34" charset="-120"/>
+            </a:endParaRPr>
           </a:p>
         </p:txBody>
       </p:sp>
@@ -5408,11 +5471,17 @@
           <a:lstStyle/>
           <a:p>
             <a:r>
-              <a:rPr lang="zh-TW" altLang="en-US" sz="6000" dirty="0" smtClean="0"/>
+              <a:rPr lang="zh-TW" altLang="en-US" sz="6000" dirty="0" smtClean="0">
+                <a:latin typeface="微軟正黑體" pitchFamily="34" charset="-120"/>
+                <a:ea typeface="微軟正黑體" pitchFamily="34" charset="-120"/>
+              </a:rPr>
               <a:t>世上的君王和萬民，首領和世上一切審判官，少年人和處女，老年人和孩童，都當讚美耶和華！</a:t>
             </a:r>
             <a:r>
-              <a:rPr lang="en-US" altLang="zh-TW" sz="6000" dirty="0" smtClean="0"/>
+              <a:rPr lang="en-US" altLang="zh-TW" sz="6000" dirty="0" smtClean="0">
+                <a:latin typeface="微軟正黑體" pitchFamily="34" charset="-120"/>
+                <a:ea typeface="微軟正黑體" pitchFamily="34" charset="-120"/>
+              </a:rPr>
               <a:t> </a:t>
             </a:r>
           </a:p>
@@ -5473,30 +5542,33 @@
           <a:lstStyle/>
           <a:p>
             <a:r>
-              <a:rPr lang="zh-TW" altLang="en-US" sz="6000" b="1" dirty="0" smtClean="0"/>
-              <a:t>要</a:t>
-            </a:r>
-            <a:r>
-              <a:rPr lang="zh-TW" altLang="en-US" sz="6000" b="1" dirty="0" smtClean="0"/>
-              <a:t>用角聲讚美他，鼓瑟彈琴讚美他！擊鼓跳舞讚美他！用絲弦的樂器和簫的聲音讚美他！</a:t>
-            </a:r>
-            <a:r>
-              <a:rPr lang="en-US" altLang="zh-TW" sz="6000" b="1" dirty="0" smtClean="0"/>
+              <a:rPr lang="zh-TW" altLang="en-US" sz="6000" b="1" dirty="0" smtClean="0">
+                <a:latin typeface="微軟正黑體" pitchFamily="34" charset="-120"/>
+                <a:ea typeface="微軟正黑體" pitchFamily="34" charset="-120"/>
+              </a:rPr>
+              <a:t>要用角聲讚美他，鼓瑟彈琴讚美他！擊鼓跳舞讚美他！用絲弦的樂器和簫的聲音讚美他！</a:t>
+            </a:r>
+            <a:r>
+              <a:rPr lang="en-US" altLang="zh-TW" sz="6000" b="1" dirty="0" smtClean="0">
+                <a:latin typeface="微軟正黑體" pitchFamily="34" charset="-120"/>
+                <a:ea typeface="微軟正黑體" pitchFamily="34" charset="-120"/>
+              </a:rPr>
               <a:t> </a:t>
             </a:r>
-            <a:endParaRPr lang="en-US" altLang="zh-TW" sz="6000" b="1" dirty="0" smtClean="0"/>
-          </a:p>
-          <a:p>
-            <a:r>
-              <a:rPr lang="zh-TW" altLang="en-US" sz="6000" dirty="0" smtClean="0"/>
-              <a:t>用</a:t>
-            </a:r>
-            <a:r>
-              <a:rPr lang="zh-TW" altLang="en-US" sz="6000" dirty="0" smtClean="0"/>
-              <a:t>大響的鈸讚美他！用高聲的鈸讚美他！</a:t>
-            </a:r>
-            <a:r>
-              <a:rPr lang="en-US" altLang="zh-TW" sz="6000" dirty="0" smtClean="0"/>
+          </a:p>
+          <a:p>
+            <a:r>
+              <a:rPr lang="zh-TW" altLang="en-US" sz="6000" dirty="0" smtClean="0">
+                <a:latin typeface="微軟正黑體" pitchFamily="34" charset="-120"/>
+                <a:ea typeface="微軟正黑體" pitchFamily="34" charset="-120"/>
+              </a:rPr>
+              <a:t>用大響的鈸讚美他！用高聲的鈸讚美他！</a:t>
+            </a:r>
+            <a:r>
+              <a:rPr lang="en-US" altLang="zh-TW" sz="6000" dirty="0" smtClean="0">
+                <a:latin typeface="微軟正黑體" pitchFamily="34" charset="-120"/>
+                <a:ea typeface="微軟正黑體" pitchFamily="34" charset="-120"/>
+              </a:rPr>
               <a:t> </a:t>
             </a:r>
           </a:p>
@@ -5557,15 +5629,17 @@
           <a:lstStyle/>
           <a:p>
             <a:r>
-              <a:rPr lang="zh-TW" altLang="en-US" sz="6000" b="1" smtClean="0"/>
-              <a:t>凡</a:t>
-            </a:r>
-            <a:r>
-              <a:rPr lang="zh-TW" altLang="en-US" sz="6000" b="1" dirty="0" smtClean="0"/>
-              <a:t>有氣息的都要讚美耶和華！你們要讚美耶和華！</a:t>
-            </a:r>
-            <a:r>
-              <a:rPr lang="en-US" altLang="zh-TW" sz="6000" b="1" dirty="0" smtClean="0"/>
+              <a:rPr lang="zh-TW" altLang="en-US" sz="6000" b="1" dirty="0" smtClean="0">
+                <a:latin typeface="微軟正黑體" pitchFamily="34" charset="-120"/>
+                <a:ea typeface="微軟正黑體" pitchFamily="34" charset="-120"/>
+              </a:rPr>
+              <a:t>凡有氣息的都要讚美耶和華！你們要讚美耶和華！</a:t>
+            </a:r>
+            <a:r>
+              <a:rPr lang="en-US" altLang="zh-TW" sz="6000" b="1" dirty="0" smtClean="0">
+                <a:latin typeface="微軟正黑體" pitchFamily="34" charset="-120"/>
+                <a:ea typeface="微軟正黑體" pitchFamily="34" charset="-120"/>
+              </a:rPr>
               <a:t> </a:t>
             </a:r>
           </a:p>

</xml_diff>